<commit_message>
edit Kostja's photo in presentation
</commit_message>
<xml_diff>
--- a/Presentation.pptx
+++ b/Presentation.pptx
@@ -203,7 +203,7 @@
           <a:p>
             <a:fld id="{4A31E123-2BF7-4E09-8E3A-1A124F558CEB}" type="datetimeFigureOut">
               <a:rPr lang="en-US" smtClean="0"/>
-              <a:t>4/20/2016</a:t>
+              <a:t>4/21/2016</a:t>
             </a:fld>
             <a:endParaRPr lang="en-US"/>
           </a:p>
@@ -1276,7 +1276,7 @@
           <a:p>
             <a:fld id="{B9FF902B-FEAB-45BE-93B9-61003E741777}" type="datetimeFigureOut">
               <a:rPr lang="en-US" smtClean="0"/>
-              <a:t>4/20/2016</a:t>
+              <a:t>4/21/2016</a:t>
             </a:fld>
             <a:endParaRPr lang="en-US"/>
           </a:p>
@@ -1527,7 +1527,7 @@
           <a:p>
             <a:fld id="{B9FF902B-FEAB-45BE-93B9-61003E741777}" type="datetimeFigureOut">
               <a:rPr lang="en-US" smtClean="0"/>
-              <a:t>4/20/2016</a:t>
+              <a:t>4/21/2016</a:t>
             </a:fld>
             <a:endParaRPr lang="en-US"/>
           </a:p>
@@ -1841,7 +1841,7 @@
           <a:p>
             <a:fld id="{B9FF902B-FEAB-45BE-93B9-61003E741777}" type="datetimeFigureOut">
               <a:rPr lang="en-US" smtClean="0"/>
-              <a:t>4/20/2016</a:t>
+              <a:t>4/21/2016</a:t>
             </a:fld>
             <a:endParaRPr lang="en-US"/>
           </a:p>
@@ -2182,7 +2182,7 @@
           <a:p>
             <a:fld id="{B9FF902B-FEAB-45BE-93B9-61003E741777}" type="datetimeFigureOut">
               <a:rPr lang="en-US" smtClean="0"/>
-              <a:t>4/20/2016</a:t>
+              <a:t>4/21/2016</a:t>
             </a:fld>
             <a:endParaRPr lang="en-US"/>
           </a:p>
@@ -2496,7 +2496,7 @@
           <a:p>
             <a:fld id="{B9FF902B-FEAB-45BE-93B9-61003E741777}" type="datetimeFigureOut">
               <a:rPr lang="en-US" smtClean="0"/>
-              <a:t>4/20/2016</a:t>
+              <a:t>4/21/2016</a:t>
             </a:fld>
             <a:endParaRPr lang="en-US"/>
           </a:p>
@@ -2889,7 +2889,7 @@
           <a:p>
             <a:fld id="{B9FF902B-FEAB-45BE-93B9-61003E741777}" type="datetimeFigureOut">
               <a:rPr lang="en-US" smtClean="0"/>
-              <a:t>4/20/2016</a:t>
+              <a:t>4/21/2016</a:t>
             </a:fld>
             <a:endParaRPr lang="en-US"/>
           </a:p>
@@ -3059,7 +3059,7 @@
           <a:p>
             <a:fld id="{B9FF902B-FEAB-45BE-93B9-61003E741777}" type="datetimeFigureOut">
               <a:rPr lang="en-US" smtClean="0"/>
-              <a:t>4/20/2016</a:t>
+              <a:t>4/21/2016</a:t>
             </a:fld>
             <a:endParaRPr lang="en-US"/>
           </a:p>
@@ -3239,7 +3239,7 @@
           <a:p>
             <a:fld id="{B9FF902B-FEAB-45BE-93B9-61003E741777}" type="datetimeFigureOut">
               <a:rPr lang="en-US" smtClean="0"/>
-              <a:t>4/20/2016</a:t>
+              <a:t>4/21/2016</a:t>
             </a:fld>
             <a:endParaRPr lang="en-US"/>
           </a:p>
@@ -3415,7 +3415,7 @@
           <a:p>
             <a:fld id="{B9FF902B-FEAB-45BE-93B9-61003E741777}" type="datetimeFigureOut">
               <a:rPr lang="en-US" smtClean="0"/>
-              <a:t>4/20/2016</a:t>
+              <a:t>4/21/2016</a:t>
             </a:fld>
             <a:endParaRPr lang="en-US"/>
           </a:p>
@@ -3662,7 +3662,7 @@
           <a:p>
             <a:fld id="{B9FF902B-FEAB-45BE-93B9-61003E741777}" type="datetimeFigureOut">
               <a:rPr lang="en-US" smtClean="0"/>
-              <a:t>4/20/2016</a:t>
+              <a:t>4/21/2016</a:t>
             </a:fld>
             <a:endParaRPr lang="en-US"/>
           </a:p>
@@ -3894,7 +3894,7 @@
           <a:p>
             <a:fld id="{B9FF902B-FEAB-45BE-93B9-61003E741777}" type="datetimeFigureOut">
               <a:rPr lang="en-US" smtClean="0"/>
-              <a:t>4/20/2016</a:t>
+              <a:t>4/21/2016</a:t>
             </a:fld>
             <a:endParaRPr lang="en-US"/>
           </a:p>
@@ -4268,7 +4268,7 @@
           <a:p>
             <a:fld id="{B9FF902B-FEAB-45BE-93B9-61003E741777}" type="datetimeFigureOut">
               <a:rPr lang="en-US" smtClean="0"/>
-              <a:t>4/20/2016</a:t>
+              <a:t>4/21/2016</a:t>
             </a:fld>
             <a:endParaRPr lang="en-US"/>
           </a:p>
@@ -4391,7 +4391,7 @@
           <a:p>
             <a:fld id="{B9FF902B-FEAB-45BE-93B9-61003E741777}" type="datetimeFigureOut">
               <a:rPr lang="en-US" smtClean="0"/>
-              <a:t>4/20/2016</a:t>
+              <a:t>4/21/2016</a:t>
             </a:fld>
             <a:endParaRPr lang="en-US"/>
           </a:p>
@@ -4486,7 +4486,7 @@
           <a:p>
             <a:fld id="{B9FF902B-FEAB-45BE-93B9-61003E741777}" type="datetimeFigureOut">
               <a:rPr lang="en-US" smtClean="0"/>
-              <a:t>4/20/2016</a:t>
+              <a:t>4/21/2016</a:t>
             </a:fld>
             <a:endParaRPr lang="en-US"/>
           </a:p>
@@ -4741,7 +4741,7 @@
           <a:p>
             <a:fld id="{B9FF902B-FEAB-45BE-93B9-61003E741777}" type="datetimeFigureOut">
               <a:rPr lang="en-US" smtClean="0"/>
-              <a:t>4/20/2016</a:t>
+              <a:t>4/21/2016</a:t>
             </a:fld>
             <a:endParaRPr lang="en-US"/>
           </a:p>
@@ -5004,7 +5004,7 @@
           <a:p>
             <a:fld id="{B9FF902B-FEAB-45BE-93B9-61003E741777}" type="datetimeFigureOut">
               <a:rPr lang="en-US" smtClean="0"/>
-              <a:t>4/20/2016</a:t>
+              <a:t>4/21/2016</a:t>
             </a:fld>
             <a:endParaRPr lang="en-US"/>
           </a:p>
@@ -5747,7 +5747,7 @@
           <a:p>
             <a:fld id="{B9FF902B-FEAB-45BE-93B9-61003E741777}" type="datetimeFigureOut">
               <a:rPr lang="en-US" smtClean="0"/>
-              <a:t>4/20/2016</a:t>
+              <a:t>4/21/2016</a:t>
             </a:fld>
             <a:endParaRPr lang="en-US"/>
           </a:p>
@@ -6510,7 +6510,7 @@
           <p:nvPr/>
         </p:nvPicPr>
         <p:blipFill>
-          <a:blip r:embed="rId4">
+          <a:blip r:embed="rId4" cstate="print">
             <a:extLst>
               <a:ext uri="{28A0092B-C50C-407E-A947-70E740481C1C}">
                 <a14:useLocalDpi xmlns:a14="http://schemas.microsoft.com/office/drawing/2010/main" val="0"/>
@@ -6523,8 +6523,8 @@
         </p:blipFill>
         <p:spPr>
           <a:xfrm>
-            <a:off x="3924108" y="1415522"/>
-            <a:ext cx="2103120" cy="2125980"/>
+            <a:off x="3924108" y="1426952"/>
+            <a:ext cx="2103120" cy="2103120"/>
           </a:xfrm>
           <a:prstGeom prst="rect">
             <a:avLst/>
@@ -6716,7 +6716,7 @@
           <p:nvPr/>
         </p:nvPicPr>
         <p:blipFill>
-          <a:blip r:embed="rId3">
+          <a:blip r:embed="rId3" cstate="print">
             <a:duotone>
               <a:schemeClr val="bg2">
                 <a:shade val="45000"/>
@@ -6736,8 +6736,8 @@
         </p:blipFill>
         <p:spPr>
           <a:xfrm>
-            <a:off x="6773939" y="1270000"/>
-            <a:ext cx="2103120" cy="2125980"/>
+            <a:off x="6773939" y="1281430"/>
+            <a:ext cx="2103120" cy="2103120"/>
           </a:xfrm>
           <a:prstGeom prst="rect">
             <a:avLst/>

</xml_diff>